<commit_message>
Add plots to Powerpoint
</commit_message>
<xml_diff>
--- a/Project1-ExploreVis/davidletzler1/NYCSchoolMap.pptx
+++ b/Project1-ExploreVis/davidletzler1/NYCSchoolMap.pptx
@@ -9,8 +9,10 @@
     <p:sldId id="257" r:id="rId3"/>
     <p:sldId id="258" r:id="rId4"/>
     <p:sldId id="259" r:id="rId5"/>
-    <p:sldId id="260" r:id="rId6"/>
-    <p:sldId id="261" r:id="rId7"/>
+    <p:sldId id="262" r:id="rId6"/>
+    <p:sldId id="263" r:id="rId7"/>
+    <p:sldId id="260" r:id="rId8"/>
+    <p:sldId id="261" r:id="rId9"/>
   </p:sldIdLst>
   <p:sldSz cx="12192000" cy="6858000"/>
   <p:notesSz cx="6858000" cy="9144000"/>
@@ -109,6 +111,11 @@
       </a:defRPr>
     </a:lvl9pPr>
   </p:defaultTextStyle>
+  <p:extLst>
+    <p:ext uri="{EFAFB233-063F-42B5-8137-9DF3F51BA10A}">
+      <p15:sldGuideLst xmlns:p15="http://schemas.microsoft.com/office/powerpoint/2012/main"/>
+    </p:ext>
+  </p:extLst>
 </p:presentation>
 </file>
 
@@ -298,7 +305,7 @@
           <a:p>
             <a:fld id="{4AAD347D-5ACD-4C99-B74B-A9C85AD731AF}" type="datetimeFigureOut">
               <a:rPr lang="en-US" dirty="0"/>
-              <a:t>1/29/2017</a:t>
+              <a:t>2/14/2017</a:t>
             </a:fld>
             <a:endParaRPr lang="en-US" dirty="0"/>
           </a:p>
@@ -568,7 +575,7 @@
           <a:p>
             <a:fld id="{4509A250-FF31-4206-8172-F9D3106AACB1}" type="datetimeFigureOut">
               <a:rPr lang="en-US" dirty="0"/>
-              <a:t>1/29/2017</a:t>
+              <a:t>2/14/2017</a:t>
             </a:fld>
             <a:endParaRPr lang="en-US" dirty="0"/>
           </a:p>
@@ -757,7 +764,7 @@
           <a:p>
             <a:fld id="{4509A250-FF31-4206-8172-F9D3106AACB1}" type="datetimeFigureOut">
               <a:rPr lang="en-US" dirty="0"/>
-              <a:t>1/29/2017</a:t>
+              <a:t>2/14/2017</a:t>
             </a:fld>
             <a:endParaRPr lang="en-US" dirty="0"/>
           </a:p>
@@ -1025,7 +1032,7 @@
           <a:p>
             <a:fld id="{4509A250-FF31-4206-8172-F9D3106AACB1}" type="datetimeFigureOut">
               <a:rPr lang="en-US" dirty="0"/>
-              <a:t>1/29/2017</a:t>
+              <a:t>2/14/2017</a:t>
             </a:fld>
             <a:endParaRPr lang="en-US" dirty="0"/>
           </a:p>
@@ -1361,7 +1368,7 @@
           <a:p>
             <a:fld id="{4509A250-FF31-4206-8172-F9D3106AACB1}" type="datetimeFigureOut">
               <a:rPr lang="en-US" dirty="0"/>
-              <a:t>1/29/2017</a:t>
+              <a:t>2/14/2017</a:t>
             </a:fld>
             <a:endParaRPr lang="en-US" dirty="0"/>
           </a:p>
@@ -1979,7 +1986,7 @@
           <a:p>
             <a:fld id="{4509A250-FF31-4206-8172-F9D3106AACB1}" type="datetimeFigureOut">
               <a:rPr lang="en-US" dirty="0"/>
-              <a:t>1/29/2017</a:t>
+              <a:t>2/14/2017</a:t>
             </a:fld>
             <a:endParaRPr lang="en-US" dirty="0"/>
           </a:p>
@@ -2834,7 +2841,7 @@
           <a:p>
             <a:fld id="{4509A250-FF31-4206-8172-F9D3106AACB1}" type="datetimeFigureOut">
               <a:rPr lang="en-US" dirty="0"/>
-              <a:t>1/29/2017</a:t>
+              <a:t>2/14/2017</a:t>
             </a:fld>
             <a:endParaRPr lang="en-US" dirty="0"/>
           </a:p>
@@ -2999,7 +3006,7 @@
           <a:p>
             <a:fld id="{4509A250-FF31-4206-8172-F9D3106AACB1}" type="datetimeFigureOut">
               <a:rPr lang="en-US" dirty="0"/>
-              <a:t>1/29/2017</a:t>
+              <a:t>2/14/2017</a:t>
             </a:fld>
             <a:endParaRPr lang="en-US" dirty="0"/>
           </a:p>
@@ -3174,7 +3181,7 @@
           <a:p>
             <a:fld id="{4509A250-FF31-4206-8172-F9D3106AACB1}" type="datetimeFigureOut">
               <a:rPr lang="en-US" dirty="0"/>
-              <a:t>1/29/2017</a:t>
+              <a:t>2/14/2017</a:t>
             </a:fld>
             <a:endParaRPr lang="en-US" dirty="0"/>
           </a:p>
@@ -3339,7 +3346,7 @@
           <a:p>
             <a:fld id="{4509A250-FF31-4206-8172-F9D3106AACB1}" type="datetimeFigureOut">
               <a:rPr lang="en-US" dirty="0"/>
-              <a:t>1/29/2017</a:t>
+              <a:t>2/14/2017</a:t>
             </a:fld>
             <a:endParaRPr lang="en-US" dirty="0"/>
           </a:p>
@@ -3581,7 +3588,7 @@
           <a:p>
             <a:fld id="{9796027F-7875-4030-9381-8BD8C4F21935}" type="datetimeFigureOut">
               <a:rPr lang="en-US" dirty="0"/>
-              <a:t>1/29/2017</a:t>
+              <a:t>2/14/2017</a:t>
             </a:fld>
             <a:endParaRPr lang="en-US" dirty="0"/>
           </a:p>
@@ -3868,7 +3875,7 @@
           <a:p>
             <a:fld id="{9796027F-7875-4030-9381-8BD8C4F21935}" type="datetimeFigureOut">
               <a:rPr lang="en-US" dirty="0"/>
-              <a:t>1/29/2017</a:t>
+              <a:t>2/14/2017</a:t>
             </a:fld>
             <a:endParaRPr lang="en-US" dirty="0"/>
           </a:p>
@@ -4307,7 +4314,7 @@
           <a:p>
             <a:fld id="{9796027F-7875-4030-9381-8BD8C4F21935}" type="datetimeFigureOut">
               <a:rPr lang="en-US" dirty="0"/>
-              <a:t>1/29/2017</a:t>
+              <a:t>2/14/2017</a:t>
             </a:fld>
             <a:endParaRPr lang="en-US" dirty="0"/>
           </a:p>
@@ -4420,7 +4427,7 @@
           <a:p>
             <a:fld id="{4509A250-FF31-4206-8172-F9D3106AACB1}" type="datetimeFigureOut">
               <a:rPr lang="en-US" dirty="0"/>
-              <a:t>1/29/2017</a:t>
+              <a:t>2/14/2017</a:t>
             </a:fld>
             <a:endParaRPr lang="en-US" dirty="0"/>
           </a:p>
@@ -4510,7 +4517,7 @@
           <a:p>
             <a:fld id="{4509A250-FF31-4206-8172-F9D3106AACB1}" type="datetimeFigureOut">
               <a:rPr lang="en-US" dirty="0"/>
-              <a:t>1/29/2017</a:t>
+              <a:t>2/14/2017</a:t>
             </a:fld>
             <a:endParaRPr lang="en-US" dirty="0"/>
           </a:p>
@@ -4784,7 +4791,7 @@
           <a:p>
             <a:fld id="{4509A250-FF31-4206-8172-F9D3106AACB1}" type="datetimeFigureOut">
               <a:rPr lang="en-US" dirty="0"/>
-              <a:t>1/29/2017</a:t>
+              <a:t>2/14/2017</a:t>
             </a:fld>
             <a:endParaRPr lang="en-US" dirty="0"/>
           </a:p>
@@ -5054,7 +5061,7 @@
           <a:p>
             <a:fld id="{4509A250-FF31-4206-8172-F9D3106AACB1}" type="datetimeFigureOut">
               <a:rPr lang="en-US" dirty="0"/>
-              <a:t>1/29/2017</a:t>
+              <a:t>2/14/2017</a:t>
             </a:fld>
             <a:endParaRPr lang="en-US" dirty="0"/>
           </a:p>
@@ -5478,7 +5485,7 @@
           <a:p>
             <a:fld id="{4AAD347D-5ACD-4C99-B74B-A9C85AD731AF}" type="datetimeFigureOut">
               <a:rPr lang="en-US" dirty="0"/>
-              <a:t>1/29/2017</a:t>
+              <a:t>2/14/2017</a:t>
             </a:fld>
             <a:endParaRPr lang="en-US" dirty="0"/>
           </a:p>
@@ -6373,9 +6380,6 @@
               </a:rPr>
               <a:t>Scores can be filtered to ELA/Math tests, any year in 2013-2016, any grade 3-8 (or all), any income quintile (or all), and any range of proficient students </a:t>
             </a:r>
-            <a:endParaRPr lang="en-US" sz="2400" dirty="0">
-              <a:latin typeface="Cambria" panose="02040503050406030204" pitchFamily="18" charset="0"/>
-            </a:endParaRPr>
           </a:p>
           <a:p>
             <a:pPr marL="342900" indent="-342900">
@@ -6418,16 +6422,64 @@
           <a:chExt cx="0" cy="0"/>
         </a:xfrm>
       </p:grpSpPr>
-      <p:sp>
-        <p:nvSpPr>
-          <p:cNvPr id="2" name="TextBox 1"/>
+      <p:pic>
+        <p:nvPicPr>
+          <p:cNvPr id="3" name="Picture 2"/>
+          <p:cNvPicPr>
+            <a:picLocks noChangeAspect="1"/>
+          </p:cNvPicPr>
+          <p:nvPr/>
+        </p:nvPicPr>
+        <p:blipFill>
+          <a:blip r:embed="rId2"/>
+          <a:stretch>
+            <a:fillRect/>
+          </a:stretch>
+        </p:blipFill>
+        <p:spPr>
+          <a:xfrm>
+            <a:off x="0" y="2641600"/>
+            <a:ext cx="6026343" cy="3269584"/>
+          </a:xfrm>
+          <a:prstGeom prst="rect">
+            <a:avLst/>
+          </a:prstGeom>
+        </p:spPr>
+      </p:pic>
+      <p:pic>
+        <p:nvPicPr>
+          <p:cNvPr id="4" name="Picture 3"/>
+          <p:cNvPicPr>
+            <a:picLocks noChangeAspect="1"/>
+          </p:cNvPicPr>
+          <p:nvPr/>
+        </p:nvPicPr>
+        <p:blipFill>
+          <a:blip r:embed="rId3"/>
+          <a:stretch>
+            <a:fillRect/>
+          </a:stretch>
+        </p:blipFill>
+        <p:spPr>
+          <a:xfrm>
+            <a:off x="6163438" y="2641600"/>
+            <a:ext cx="6028562" cy="3270788"/>
+          </a:xfrm>
+          <a:prstGeom prst="rect">
+            <a:avLst/>
+          </a:prstGeom>
+        </p:spPr>
+      </p:pic>
+      <p:sp>
+        <p:nvSpPr>
+          <p:cNvPr id="6" name="TextBox 5"/>
           <p:cNvSpPr txBox="1"/>
           <p:nvPr/>
         </p:nvSpPr>
         <p:spPr>
           <a:xfrm>
-            <a:off x="923192" y="861646"/>
-            <a:ext cx="10199078" cy="4832092"/>
+            <a:off x="2373745" y="757382"/>
+            <a:ext cx="7139710" cy="954107"/>
           </a:xfrm>
           <a:prstGeom prst="rect">
             <a:avLst/>
@@ -6445,133 +6497,8 @@
               <a:rPr lang="en-US" sz="2800" b="1" dirty="0">
                 <a:latin typeface="Cambria" panose="02040503050406030204" pitchFamily="18" charset="0"/>
               </a:rPr>
-              <a:t>Key Results (Part 1)</a:t>
-            </a:r>
-          </a:p>
-          <a:p>
-            <a:endParaRPr lang="en-US" sz="2400" dirty="0">
-              <a:latin typeface="Cambria" panose="02040503050406030204" pitchFamily="18" charset="0"/>
-            </a:endParaRPr>
-          </a:p>
-          <a:p>
-            <a:pPr marL="342900" indent="-342900">
-              <a:buFont typeface="Arial" panose="020B0604020202020204" pitchFamily="34" charset="0"/>
-              <a:buChar char="•"/>
-            </a:pPr>
-            <a:r>
-              <a:rPr lang="en-US" sz="2400" dirty="0">
-                <a:latin typeface="Cambria" panose="02040503050406030204" pitchFamily="18" charset="0"/>
-              </a:rPr>
-              <a:t>Correlation between Math Proficiency/Median Income: r=0.47,  p=2x10</a:t>
-            </a:r>
-            <a:r>
-              <a:rPr lang="en-US" sz="2400" baseline="30000" dirty="0">
-                <a:latin typeface="Cambria" panose="02040503050406030204" pitchFamily="18" charset="0"/>
-              </a:rPr>
-              <a:t>-16</a:t>
-            </a:r>
-          </a:p>
-          <a:p>
-            <a:pPr marL="342900" indent="-342900">
-              <a:buFont typeface="Arial" panose="020B0604020202020204" pitchFamily="34" charset="0"/>
-              <a:buChar char="•"/>
-            </a:pPr>
-            <a:r>
-              <a:rPr lang="en-US" sz="2400" dirty="0">
-                <a:latin typeface="Cambria" panose="02040503050406030204" pitchFamily="18" charset="0"/>
-              </a:rPr>
-              <a:t>Correlation between ELA Proficiency/Median Income: r=0.51,  p=2x10</a:t>
-            </a:r>
-            <a:r>
-              <a:rPr lang="en-US" sz="2400" baseline="30000" dirty="0">
-                <a:latin typeface="Cambria" panose="02040503050406030204" pitchFamily="18" charset="0"/>
-              </a:rPr>
-              <a:t>-16</a:t>
-            </a:r>
-          </a:p>
-          <a:p>
-            <a:pPr marL="342900" indent="-342900">
-              <a:buFont typeface="Arial" panose="020B0604020202020204" pitchFamily="34" charset="0"/>
-              <a:buChar char="•"/>
-            </a:pPr>
-            <a:endParaRPr lang="en-US" sz="2400" baseline="30000" dirty="0">
-              <a:latin typeface="Cambria" panose="02040503050406030204" pitchFamily="18" charset="0"/>
-            </a:endParaRPr>
-          </a:p>
-          <a:p>
-            <a:pPr marL="342900" indent="-342900">
-              <a:buFont typeface="Arial" panose="020B0604020202020204" pitchFamily="34" charset="0"/>
-              <a:buChar char="•"/>
-            </a:pPr>
-            <a:r>
-              <a:rPr lang="en-US" sz="2400" dirty="0">
-                <a:latin typeface="Cambria" panose="02040503050406030204" pitchFamily="18" charset="0"/>
-              </a:rPr>
-              <a:t>Average Proficient by Year (ELA/Math):  </a:t>
-            </a:r>
-          </a:p>
-          <a:p>
-            <a:r>
-              <a:rPr lang="en-US" sz="2400" dirty="0">
-                <a:latin typeface="Cambria" panose="02040503050406030204" pitchFamily="18" charset="0"/>
-              </a:rPr>
-              <a:t>		2013: 27.6%, 31.0%				2014 : 29.5%, 35.6%		</a:t>
-            </a:r>
-          </a:p>
-          <a:p>
-            <a:r>
-              <a:rPr lang="en-US" sz="2400" dirty="0">
-                <a:latin typeface="Cambria" panose="02040503050406030204" pitchFamily="18" charset="0"/>
-              </a:rPr>
-              <a:t>		2015: 31.5%, 36.4%				2016: 39. 3%, 37.6%</a:t>
-            </a:r>
-          </a:p>
-          <a:p>
-            <a:endParaRPr lang="en-US" sz="2400" dirty="0">
-              <a:latin typeface="Cambria" panose="02040503050406030204" pitchFamily="18" charset="0"/>
-            </a:endParaRPr>
-          </a:p>
-          <a:p>
-            <a:pPr marL="342900" indent="-342900">
-              <a:buFont typeface="Arial" panose="020B0604020202020204" pitchFamily="34" charset="0"/>
-              <a:buChar char="•"/>
-            </a:pPr>
-            <a:r>
-              <a:rPr lang="en-US" sz="2400" dirty="0">
-                <a:latin typeface="Cambria" panose="02040503050406030204" pitchFamily="18" charset="0"/>
-              </a:rPr>
-              <a:t>Average Proficient by Grade (ELA/Math):</a:t>
-            </a:r>
-          </a:p>
-          <a:p>
-            <a:pPr lvl="2"/>
-            <a:r>
-              <a:rPr lang="en-US" sz="2400" dirty="0">
-                <a:latin typeface="Cambria" panose="02040503050406030204" pitchFamily="18" charset="0"/>
-              </a:rPr>
-              <a:t>3        33.1%, 38.6%		4        33.7%, 40.1%</a:t>
-            </a:r>
-          </a:p>
-          <a:p>
-            <a:pPr lvl="2"/>
-            <a:r>
-              <a:rPr lang="en-US" sz="2400" dirty="0">
-                <a:latin typeface="Cambria" panose="02040503050406030204" pitchFamily="18" charset="0"/>
-              </a:rPr>
-              <a:t>5        31.4%, 37.9%		6        29.4%, 34.9%</a:t>
-            </a:r>
-          </a:p>
-          <a:p>
-            <a:pPr lvl="2"/>
-            <a:r>
-              <a:rPr lang="en-US" sz="2400" dirty="0">
-                <a:latin typeface="Cambria" panose="02040503050406030204" pitchFamily="18" charset="0"/>
-              </a:rPr>
-              <a:t>7        30.4%, 31.6%		8        33.6%, 25.6%</a:t>
-            </a:r>
-            <a:endParaRPr lang="en-US" sz="2400" dirty="0">
-              <a:latin typeface="Cambria" panose="02040503050406030204" pitchFamily="18" charset="0"/>
-            </a:endParaRPr>
+              <a:t>School Proficiency is Correlated (Imperfectly) with Neighborhood Income</a:t>
+            </a:r>
           </a:p>
         </p:txBody>
       </p:sp>
@@ -6605,16 +6532,40 @@
           <a:chExt cx="0" cy="0"/>
         </a:xfrm>
       </p:grpSpPr>
-      <p:sp>
-        <p:nvSpPr>
-          <p:cNvPr id="2" name="TextBox 1"/>
+      <p:pic>
+        <p:nvPicPr>
+          <p:cNvPr id="2" name="Picture 1"/>
+          <p:cNvPicPr>
+            <a:picLocks noChangeAspect="1"/>
+          </p:cNvPicPr>
+          <p:nvPr/>
+        </p:nvPicPr>
+        <p:blipFill>
+          <a:blip r:embed="rId2"/>
+          <a:stretch>
+            <a:fillRect/>
+          </a:stretch>
+        </p:blipFill>
+        <p:spPr>
+          <a:xfrm>
+            <a:off x="2614114" y="1856597"/>
+            <a:ext cx="7056134" cy="3828296"/>
+          </a:xfrm>
+          <a:prstGeom prst="rect">
+            <a:avLst/>
+          </a:prstGeom>
+        </p:spPr>
+      </p:pic>
+      <p:sp>
+        <p:nvSpPr>
+          <p:cNvPr id="3" name="TextBox 2"/>
           <p:cNvSpPr txBox="1"/>
           <p:nvPr/>
         </p:nvSpPr>
         <p:spPr>
           <a:xfrm>
-            <a:off x="1664208" y="1381096"/>
-            <a:ext cx="9125712" cy="3908762"/>
+            <a:off x="2710872" y="849746"/>
+            <a:ext cx="6862618" cy="523220"/>
           </a:xfrm>
           <a:prstGeom prst="rect">
             <a:avLst/>
@@ -6632,103 +6583,15 @@
               <a:rPr lang="en-US" sz="2800" b="1" dirty="0">
                 <a:latin typeface="Cambria" panose="02040503050406030204" pitchFamily="18" charset="0"/>
               </a:rPr>
-              <a:t>Key Results (Part 2)</a:t>
-            </a:r>
-          </a:p>
-          <a:p>
-            <a:pPr algn="ctr"/>
-            <a:endParaRPr lang="en-US" sz="2800" b="1" dirty="0">
-              <a:latin typeface="Cambria" panose="02040503050406030204" pitchFamily="18" charset="0"/>
-            </a:endParaRPr>
-          </a:p>
-          <a:p>
-            <a:r>
-              <a:rPr lang="en-US" sz="2400" dirty="0">
-                <a:latin typeface="Cambria" panose="02040503050406030204" pitchFamily="18" charset="0"/>
-              </a:rPr>
-              <a:t>Third Grade 2013 to Sixth Grade 2016(Math)34.0%</a:t>
-            </a:r>
-            <a:r>
-              <a:rPr lang="en-US" sz="2400" dirty="0">
-                <a:latin typeface="Cambria" panose="02040503050406030204" pitchFamily="18" charset="0"/>
-                <a:sym typeface="Wingdings" panose="05000000000000000000" pitchFamily="2" charset="2"/>
-              </a:rPr>
-              <a:t> 38.2% </a:t>
-            </a:r>
-          </a:p>
-          <a:p>
-            <a:r>
-              <a:rPr lang="en-US" sz="2400" dirty="0">
-                <a:latin typeface="Cambria" panose="02040503050406030204" pitchFamily="18" charset="0"/>
-                <a:sym typeface="Wingdings" panose="05000000000000000000" pitchFamily="2" charset="2"/>
-              </a:rPr>
-              <a:t>Fourth Grade 2013 to Seventh Grade 2016(Math): 36.5% 35.4%</a:t>
-            </a:r>
-          </a:p>
-          <a:p>
-            <a:r>
-              <a:rPr lang="en-US" sz="2400" dirty="0">
-                <a:latin typeface="Cambria" panose="02040503050406030204" pitchFamily="18" charset="0"/>
-                <a:sym typeface="Wingdings" panose="05000000000000000000" pitchFamily="2" charset="2"/>
-              </a:rPr>
-              <a:t>Fifth Grade 2013 to Eighth Grade 2016 (Math): 30.7% 26.4%</a:t>
-            </a:r>
-            <a:endParaRPr lang="en-US" sz="2400" dirty="0">
-              <a:latin typeface="Cambria" panose="02040503050406030204" pitchFamily="18" charset="0"/>
-            </a:endParaRPr>
-          </a:p>
-          <a:p>
-            <a:endParaRPr lang="en-US" sz="2400" dirty="0">
-              <a:latin typeface="Cambria" panose="02040503050406030204" pitchFamily="18" charset="0"/>
-            </a:endParaRPr>
-          </a:p>
-          <a:p>
-            <a:r>
-              <a:rPr lang="en-US" sz="2400" dirty="0">
-                <a:latin typeface="Cambria" panose="02040503050406030204" pitchFamily="18" charset="0"/>
-              </a:rPr>
-              <a:t>Third Grade 2013 to Sixth Grade 2016(ELA): 28.9%</a:t>
-            </a:r>
-            <a:r>
-              <a:rPr lang="en-US" sz="2400" dirty="0">
-                <a:latin typeface="Cambria" panose="02040503050406030204" pitchFamily="18" charset="0"/>
-                <a:sym typeface="Wingdings" panose="05000000000000000000" pitchFamily="2" charset="2"/>
-              </a:rPr>
-              <a:t> 36.0%</a:t>
-            </a:r>
-          </a:p>
-          <a:p>
-            <a:r>
-              <a:rPr lang="en-US" sz="2400" dirty="0">
-                <a:latin typeface="Cambria" panose="02040503050406030204" pitchFamily="18" charset="0"/>
-                <a:sym typeface="Wingdings" panose="05000000000000000000" pitchFamily="2" charset="2"/>
-              </a:rPr>
-              <a:t>Fourth Grade 2013 to Seventh Grade 2016(ELA): 28.1% 37.4%</a:t>
-            </a:r>
-          </a:p>
-          <a:p>
-            <a:r>
-              <a:rPr lang="en-US" sz="2400" dirty="0">
-                <a:latin typeface="Cambria" panose="02040503050406030204" pitchFamily="18" charset="0"/>
-                <a:sym typeface="Wingdings" panose="05000000000000000000" pitchFamily="2" charset="2"/>
-              </a:rPr>
-              <a:t>Fifth Grade 2013 to Eighth Grade 2016(ELA): 29.9%42.4%</a:t>
-            </a:r>
-            <a:endParaRPr lang="en-US" sz="2400" dirty="0">
-              <a:latin typeface="Cambria" panose="02040503050406030204" pitchFamily="18" charset="0"/>
-            </a:endParaRPr>
-          </a:p>
-          <a:p>
-            <a:endParaRPr lang="en-US" sz="2400" dirty="0">
-              <a:latin typeface="Cambria" panose="02040503050406030204" pitchFamily="18" charset="0"/>
-            </a:endParaRPr>
+              <a:t>Scores are Increasing Each Year…</a:t>
+            </a:r>
           </a:p>
         </p:txBody>
       </p:sp>
     </p:spTree>
     <p:extLst>
       <p:ext uri="{BB962C8B-B14F-4D97-AF65-F5344CB8AC3E}">
-        <p14:creationId xmlns:p14="http://schemas.microsoft.com/office/powerpoint/2010/main" val="2714388764"/>
+        <p14:creationId xmlns:p14="http://schemas.microsoft.com/office/powerpoint/2010/main" val="2252839309"/>
       </p:ext>
     </p:extLst>
   </p:cSld>
@@ -6755,6 +6618,200 @@
           <a:chExt cx="0" cy="0"/>
         </a:xfrm>
       </p:grpSpPr>
+      <p:pic>
+        <p:nvPicPr>
+          <p:cNvPr id="2" name="Picture 1"/>
+          <p:cNvPicPr>
+            <a:picLocks noChangeAspect="1"/>
+          </p:cNvPicPr>
+          <p:nvPr/>
+        </p:nvPicPr>
+        <p:blipFill>
+          <a:blip r:embed="rId2"/>
+          <a:stretch>
+            <a:fillRect/>
+          </a:stretch>
+        </p:blipFill>
+        <p:spPr>
+          <a:xfrm>
+            <a:off x="2348858" y="1819652"/>
+            <a:ext cx="7056134" cy="3828296"/>
+          </a:xfrm>
+          <a:prstGeom prst="rect">
+            <a:avLst/>
+          </a:prstGeom>
+        </p:spPr>
+      </p:pic>
+      <p:sp>
+        <p:nvSpPr>
+          <p:cNvPr id="3" name="TextBox 2"/>
+          <p:cNvSpPr txBox="1"/>
+          <p:nvPr/>
+        </p:nvSpPr>
+        <p:spPr>
+          <a:xfrm>
+            <a:off x="2348858" y="831850"/>
+            <a:ext cx="7229251" cy="523220"/>
+          </a:xfrm>
+          <a:prstGeom prst="rect">
+            <a:avLst/>
+          </a:prstGeom>
+          <a:noFill/>
+        </p:spPr>
+        <p:txBody>
+          <a:bodyPr wrap="square" rtlCol="0">
+            <a:spAutoFit/>
+          </a:bodyPr>
+          <a:lstStyle/>
+          <a:p>
+            <a:r>
+              <a:rPr lang="en-US" sz="2800" b="1" dirty="0">
+                <a:latin typeface="Cambria" panose="02040503050406030204" pitchFamily="18" charset="0"/>
+              </a:rPr>
+              <a:t>…but Students Perform Worse as They Age </a:t>
+            </a:r>
+          </a:p>
+        </p:txBody>
+      </p:sp>
+    </p:spTree>
+    <p:extLst>
+      <p:ext uri="{BB962C8B-B14F-4D97-AF65-F5344CB8AC3E}">
+        <p14:creationId xmlns:p14="http://schemas.microsoft.com/office/powerpoint/2010/main" val="3039478564"/>
+      </p:ext>
+    </p:extLst>
+  </p:cSld>
+  <p:clrMapOvr>
+    <a:masterClrMapping/>
+  </p:clrMapOvr>
+</p:sld>
+</file>
+
+<file path=ppt/slides/slide7.xml><?xml version="1.0" encoding="utf-8"?>
+<p:sld xmlns:a="http://schemas.openxmlformats.org/drawingml/2006/main" xmlns:r="http://schemas.openxmlformats.org/officeDocument/2006/relationships" xmlns:p="http://schemas.openxmlformats.org/presentationml/2006/main">
+  <p:cSld>
+    <p:spTree>
+      <p:nvGrpSpPr>
+        <p:cNvPr id="1" name=""/>
+        <p:cNvGrpSpPr/>
+        <p:nvPr/>
+      </p:nvGrpSpPr>
+      <p:grpSpPr>
+        <a:xfrm>
+          <a:off x="0" y="0"/>
+          <a:ext cx="0" cy="0"/>
+          <a:chOff x="0" y="0"/>
+          <a:chExt cx="0" cy="0"/>
+        </a:xfrm>
+      </p:grpSpPr>
+      <p:pic>
+        <p:nvPicPr>
+          <p:cNvPr id="3" name="Picture 2"/>
+          <p:cNvPicPr>
+            <a:picLocks noChangeAspect="1"/>
+          </p:cNvPicPr>
+          <p:nvPr/>
+        </p:nvPicPr>
+        <p:blipFill>
+          <a:blip r:embed="rId2"/>
+          <a:stretch>
+            <a:fillRect/>
+          </a:stretch>
+        </p:blipFill>
+        <p:spPr>
+          <a:xfrm>
+            <a:off x="6132945" y="2619234"/>
+            <a:ext cx="6059055" cy="3287332"/>
+          </a:xfrm>
+          <a:prstGeom prst="rect">
+            <a:avLst/>
+          </a:prstGeom>
+        </p:spPr>
+      </p:pic>
+      <p:pic>
+        <p:nvPicPr>
+          <p:cNvPr id="6" name="Picture 5"/>
+          <p:cNvPicPr>
+            <a:picLocks noChangeAspect="1"/>
+          </p:cNvPicPr>
+          <p:nvPr/>
+        </p:nvPicPr>
+        <p:blipFill>
+          <a:blip r:embed="rId3"/>
+          <a:stretch>
+            <a:fillRect/>
+          </a:stretch>
+        </p:blipFill>
+        <p:spPr>
+          <a:xfrm>
+            <a:off x="0" y="2614223"/>
+            <a:ext cx="6068291" cy="3292343"/>
+          </a:xfrm>
+          <a:prstGeom prst="rect">
+            <a:avLst/>
+          </a:prstGeom>
+        </p:spPr>
+      </p:pic>
+      <p:sp>
+        <p:nvSpPr>
+          <p:cNvPr id="7" name="TextBox 6"/>
+          <p:cNvSpPr txBox="1"/>
+          <p:nvPr/>
+        </p:nvSpPr>
+        <p:spPr>
+          <a:xfrm>
+            <a:off x="2318327" y="1293090"/>
+            <a:ext cx="7499927" cy="523220"/>
+          </a:xfrm>
+          <a:prstGeom prst="rect">
+            <a:avLst/>
+          </a:prstGeom>
+          <a:noFill/>
+        </p:spPr>
+        <p:txBody>
+          <a:bodyPr wrap="square" rtlCol="0">
+            <a:spAutoFit/>
+          </a:bodyPr>
+          <a:lstStyle/>
+          <a:p>
+            <a:r>
+              <a:rPr lang="en-US" sz="2800" b="1" dirty="0">
+                <a:latin typeface="Cambria" panose="02040503050406030204" pitchFamily="18" charset="0"/>
+              </a:rPr>
+              <a:t>Cohorts Improve in English, but not in Math</a:t>
+            </a:r>
+          </a:p>
+        </p:txBody>
+      </p:sp>
+    </p:spTree>
+    <p:extLst>
+      <p:ext uri="{BB962C8B-B14F-4D97-AF65-F5344CB8AC3E}">
+        <p14:creationId xmlns:p14="http://schemas.microsoft.com/office/powerpoint/2010/main" val="2714388764"/>
+      </p:ext>
+    </p:extLst>
+  </p:cSld>
+  <p:clrMapOvr>
+    <a:masterClrMapping/>
+  </p:clrMapOvr>
+</p:sld>
+</file>
+
+<file path=ppt/slides/slide8.xml><?xml version="1.0" encoding="utf-8"?>
+<p:sld xmlns:a="http://schemas.openxmlformats.org/drawingml/2006/main" xmlns:r="http://schemas.openxmlformats.org/officeDocument/2006/relationships" xmlns:p="http://schemas.openxmlformats.org/presentationml/2006/main">
+  <p:cSld>
+    <p:spTree>
+      <p:nvGrpSpPr>
+        <p:cNvPr id="1" name=""/>
+        <p:cNvGrpSpPr/>
+        <p:nvPr/>
+      </p:nvGrpSpPr>
+      <p:grpSpPr>
+        <a:xfrm>
+          <a:off x="0" y="0"/>
+          <a:ext cx="0" cy="0"/>
+          <a:chOff x="0" y="0"/>
+          <a:chExt cx="0" cy="0"/>
+        </a:xfrm>
+      </p:grpSpPr>
       <p:sp>
         <p:nvSpPr>
           <p:cNvPr id="2" name="TextBox 1"/>
@@ -6841,9 +6898,6 @@
               </a:rPr>
               <a:t> Income demographics mean something, but not everything!</a:t>
             </a:r>
-            <a:endParaRPr lang="en-US" sz="2400" dirty="0">
-              <a:latin typeface="Cambria" panose="02040503050406030204" pitchFamily="18" charset="0"/>
-            </a:endParaRPr>
           </a:p>
         </p:txBody>
       </p:sp>

</xml_diff>

<commit_message>
02.14 YL Shiny App
</commit_message>
<xml_diff>
--- a/Project1-ExploreVis/davidletzler1/NYCSchoolMap.pptx
+++ b/Project1-ExploreVis/davidletzler1/NYCSchoolMap.pptx
@@ -9,8 +9,10 @@
     <p:sldId id="257" r:id="rId3"/>
     <p:sldId id="258" r:id="rId4"/>
     <p:sldId id="259" r:id="rId5"/>
-    <p:sldId id="260" r:id="rId6"/>
-    <p:sldId id="261" r:id="rId7"/>
+    <p:sldId id="262" r:id="rId6"/>
+    <p:sldId id="263" r:id="rId7"/>
+    <p:sldId id="260" r:id="rId8"/>
+    <p:sldId id="261" r:id="rId9"/>
   </p:sldIdLst>
   <p:sldSz cx="12192000" cy="6858000"/>
   <p:notesSz cx="6858000" cy="9144000"/>
@@ -109,6 +111,11 @@
       </a:defRPr>
     </a:lvl9pPr>
   </p:defaultTextStyle>
+  <p:extLst>
+    <p:ext uri="{EFAFB233-063F-42B5-8137-9DF3F51BA10A}">
+      <p15:sldGuideLst xmlns:p15="http://schemas.microsoft.com/office/powerpoint/2012/main"/>
+    </p:ext>
+  </p:extLst>
 </p:presentation>
 </file>
 
@@ -298,7 +305,7 @@
           <a:p>
             <a:fld id="{4AAD347D-5ACD-4C99-B74B-A9C85AD731AF}" type="datetimeFigureOut">
               <a:rPr lang="en-US" dirty="0"/>
-              <a:t>1/29/2017</a:t>
+              <a:t>2/14/2017</a:t>
             </a:fld>
             <a:endParaRPr lang="en-US" dirty="0"/>
           </a:p>
@@ -568,7 +575,7 @@
           <a:p>
             <a:fld id="{4509A250-FF31-4206-8172-F9D3106AACB1}" type="datetimeFigureOut">
               <a:rPr lang="en-US" dirty="0"/>
-              <a:t>1/29/2017</a:t>
+              <a:t>2/14/2017</a:t>
             </a:fld>
             <a:endParaRPr lang="en-US" dirty="0"/>
           </a:p>
@@ -757,7 +764,7 @@
           <a:p>
             <a:fld id="{4509A250-FF31-4206-8172-F9D3106AACB1}" type="datetimeFigureOut">
               <a:rPr lang="en-US" dirty="0"/>
-              <a:t>1/29/2017</a:t>
+              <a:t>2/14/2017</a:t>
             </a:fld>
             <a:endParaRPr lang="en-US" dirty="0"/>
           </a:p>
@@ -1025,7 +1032,7 @@
           <a:p>
             <a:fld id="{4509A250-FF31-4206-8172-F9D3106AACB1}" type="datetimeFigureOut">
               <a:rPr lang="en-US" dirty="0"/>
-              <a:t>1/29/2017</a:t>
+              <a:t>2/14/2017</a:t>
             </a:fld>
             <a:endParaRPr lang="en-US" dirty="0"/>
           </a:p>
@@ -1361,7 +1368,7 @@
           <a:p>
             <a:fld id="{4509A250-FF31-4206-8172-F9D3106AACB1}" type="datetimeFigureOut">
               <a:rPr lang="en-US" dirty="0"/>
-              <a:t>1/29/2017</a:t>
+              <a:t>2/14/2017</a:t>
             </a:fld>
             <a:endParaRPr lang="en-US" dirty="0"/>
           </a:p>
@@ -1979,7 +1986,7 @@
           <a:p>
             <a:fld id="{4509A250-FF31-4206-8172-F9D3106AACB1}" type="datetimeFigureOut">
               <a:rPr lang="en-US" dirty="0"/>
-              <a:t>1/29/2017</a:t>
+              <a:t>2/14/2017</a:t>
             </a:fld>
             <a:endParaRPr lang="en-US" dirty="0"/>
           </a:p>
@@ -2834,7 +2841,7 @@
           <a:p>
             <a:fld id="{4509A250-FF31-4206-8172-F9D3106AACB1}" type="datetimeFigureOut">
               <a:rPr lang="en-US" dirty="0"/>
-              <a:t>1/29/2017</a:t>
+              <a:t>2/14/2017</a:t>
             </a:fld>
             <a:endParaRPr lang="en-US" dirty="0"/>
           </a:p>
@@ -2999,7 +3006,7 @@
           <a:p>
             <a:fld id="{4509A250-FF31-4206-8172-F9D3106AACB1}" type="datetimeFigureOut">
               <a:rPr lang="en-US" dirty="0"/>
-              <a:t>1/29/2017</a:t>
+              <a:t>2/14/2017</a:t>
             </a:fld>
             <a:endParaRPr lang="en-US" dirty="0"/>
           </a:p>
@@ -3174,7 +3181,7 @@
           <a:p>
             <a:fld id="{4509A250-FF31-4206-8172-F9D3106AACB1}" type="datetimeFigureOut">
               <a:rPr lang="en-US" dirty="0"/>
-              <a:t>1/29/2017</a:t>
+              <a:t>2/14/2017</a:t>
             </a:fld>
             <a:endParaRPr lang="en-US" dirty="0"/>
           </a:p>
@@ -3339,7 +3346,7 @@
           <a:p>
             <a:fld id="{4509A250-FF31-4206-8172-F9D3106AACB1}" type="datetimeFigureOut">
               <a:rPr lang="en-US" dirty="0"/>
-              <a:t>1/29/2017</a:t>
+              <a:t>2/14/2017</a:t>
             </a:fld>
             <a:endParaRPr lang="en-US" dirty="0"/>
           </a:p>
@@ -3581,7 +3588,7 @@
           <a:p>
             <a:fld id="{9796027F-7875-4030-9381-8BD8C4F21935}" type="datetimeFigureOut">
               <a:rPr lang="en-US" dirty="0"/>
-              <a:t>1/29/2017</a:t>
+              <a:t>2/14/2017</a:t>
             </a:fld>
             <a:endParaRPr lang="en-US" dirty="0"/>
           </a:p>
@@ -3868,7 +3875,7 @@
           <a:p>
             <a:fld id="{9796027F-7875-4030-9381-8BD8C4F21935}" type="datetimeFigureOut">
               <a:rPr lang="en-US" dirty="0"/>
-              <a:t>1/29/2017</a:t>
+              <a:t>2/14/2017</a:t>
             </a:fld>
             <a:endParaRPr lang="en-US" dirty="0"/>
           </a:p>
@@ -4307,7 +4314,7 @@
           <a:p>
             <a:fld id="{9796027F-7875-4030-9381-8BD8C4F21935}" type="datetimeFigureOut">
               <a:rPr lang="en-US" dirty="0"/>
-              <a:t>1/29/2017</a:t>
+              <a:t>2/14/2017</a:t>
             </a:fld>
             <a:endParaRPr lang="en-US" dirty="0"/>
           </a:p>
@@ -4420,7 +4427,7 @@
           <a:p>
             <a:fld id="{4509A250-FF31-4206-8172-F9D3106AACB1}" type="datetimeFigureOut">
               <a:rPr lang="en-US" dirty="0"/>
-              <a:t>1/29/2017</a:t>
+              <a:t>2/14/2017</a:t>
             </a:fld>
             <a:endParaRPr lang="en-US" dirty="0"/>
           </a:p>
@@ -4510,7 +4517,7 @@
           <a:p>
             <a:fld id="{4509A250-FF31-4206-8172-F9D3106AACB1}" type="datetimeFigureOut">
               <a:rPr lang="en-US" dirty="0"/>
-              <a:t>1/29/2017</a:t>
+              <a:t>2/14/2017</a:t>
             </a:fld>
             <a:endParaRPr lang="en-US" dirty="0"/>
           </a:p>
@@ -4784,7 +4791,7 @@
           <a:p>
             <a:fld id="{4509A250-FF31-4206-8172-F9D3106AACB1}" type="datetimeFigureOut">
               <a:rPr lang="en-US" dirty="0"/>
-              <a:t>1/29/2017</a:t>
+              <a:t>2/14/2017</a:t>
             </a:fld>
             <a:endParaRPr lang="en-US" dirty="0"/>
           </a:p>
@@ -5054,7 +5061,7 @@
           <a:p>
             <a:fld id="{4509A250-FF31-4206-8172-F9D3106AACB1}" type="datetimeFigureOut">
               <a:rPr lang="en-US" dirty="0"/>
-              <a:t>1/29/2017</a:t>
+              <a:t>2/14/2017</a:t>
             </a:fld>
             <a:endParaRPr lang="en-US" dirty="0"/>
           </a:p>
@@ -5478,7 +5485,7 @@
           <a:p>
             <a:fld id="{4AAD347D-5ACD-4C99-B74B-A9C85AD731AF}" type="datetimeFigureOut">
               <a:rPr lang="en-US" dirty="0"/>
-              <a:t>1/29/2017</a:t>
+              <a:t>2/14/2017</a:t>
             </a:fld>
             <a:endParaRPr lang="en-US" dirty="0"/>
           </a:p>
@@ -6373,9 +6380,6 @@
               </a:rPr>
               <a:t>Scores can be filtered to ELA/Math tests, any year in 2013-2016, any grade 3-8 (or all), any income quintile (or all), and any range of proficient students </a:t>
             </a:r>
-            <a:endParaRPr lang="en-US" sz="2400" dirty="0">
-              <a:latin typeface="Cambria" panose="02040503050406030204" pitchFamily="18" charset="0"/>
-            </a:endParaRPr>
           </a:p>
           <a:p>
             <a:pPr marL="342900" indent="-342900">
@@ -6418,16 +6422,64 @@
           <a:chExt cx="0" cy="0"/>
         </a:xfrm>
       </p:grpSpPr>
-      <p:sp>
-        <p:nvSpPr>
-          <p:cNvPr id="2" name="TextBox 1"/>
+      <p:pic>
+        <p:nvPicPr>
+          <p:cNvPr id="3" name="Picture 2"/>
+          <p:cNvPicPr>
+            <a:picLocks noChangeAspect="1"/>
+          </p:cNvPicPr>
+          <p:nvPr/>
+        </p:nvPicPr>
+        <p:blipFill>
+          <a:blip r:embed="rId2"/>
+          <a:stretch>
+            <a:fillRect/>
+          </a:stretch>
+        </p:blipFill>
+        <p:spPr>
+          <a:xfrm>
+            <a:off x="0" y="2641600"/>
+            <a:ext cx="6026343" cy="3269584"/>
+          </a:xfrm>
+          <a:prstGeom prst="rect">
+            <a:avLst/>
+          </a:prstGeom>
+        </p:spPr>
+      </p:pic>
+      <p:pic>
+        <p:nvPicPr>
+          <p:cNvPr id="4" name="Picture 3"/>
+          <p:cNvPicPr>
+            <a:picLocks noChangeAspect="1"/>
+          </p:cNvPicPr>
+          <p:nvPr/>
+        </p:nvPicPr>
+        <p:blipFill>
+          <a:blip r:embed="rId3"/>
+          <a:stretch>
+            <a:fillRect/>
+          </a:stretch>
+        </p:blipFill>
+        <p:spPr>
+          <a:xfrm>
+            <a:off x="6163438" y="2641600"/>
+            <a:ext cx="6028562" cy="3270788"/>
+          </a:xfrm>
+          <a:prstGeom prst="rect">
+            <a:avLst/>
+          </a:prstGeom>
+        </p:spPr>
+      </p:pic>
+      <p:sp>
+        <p:nvSpPr>
+          <p:cNvPr id="6" name="TextBox 5"/>
           <p:cNvSpPr txBox="1"/>
           <p:nvPr/>
         </p:nvSpPr>
         <p:spPr>
           <a:xfrm>
-            <a:off x="923192" y="861646"/>
-            <a:ext cx="10199078" cy="4832092"/>
+            <a:off x="2373745" y="757382"/>
+            <a:ext cx="7139710" cy="954107"/>
           </a:xfrm>
           <a:prstGeom prst="rect">
             <a:avLst/>
@@ -6445,133 +6497,8 @@
               <a:rPr lang="en-US" sz="2800" b="1" dirty="0">
                 <a:latin typeface="Cambria" panose="02040503050406030204" pitchFamily="18" charset="0"/>
               </a:rPr>
-              <a:t>Key Results (Part 1)</a:t>
-            </a:r>
-          </a:p>
-          <a:p>
-            <a:endParaRPr lang="en-US" sz="2400" dirty="0">
-              <a:latin typeface="Cambria" panose="02040503050406030204" pitchFamily="18" charset="0"/>
-            </a:endParaRPr>
-          </a:p>
-          <a:p>
-            <a:pPr marL="342900" indent="-342900">
-              <a:buFont typeface="Arial" panose="020B0604020202020204" pitchFamily="34" charset="0"/>
-              <a:buChar char="•"/>
-            </a:pPr>
-            <a:r>
-              <a:rPr lang="en-US" sz="2400" dirty="0">
-                <a:latin typeface="Cambria" panose="02040503050406030204" pitchFamily="18" charset="0"/>
-              </a:rPr>
-              <a:t>Correlation between Math Proficiency/Median Income: r=0.47,  p=2x10</a:t>
-            </a:r>
-            <a:r>
-              <a:rPr lang="en-US" sz="2400" baseline="30000" dirty="0">
-                <a:latin typeface="Cambria" panose="02040503050406030204" pitchFamily="18" charset="0"/>
-              </a:rPr>
-              <a:t>-16</a:t>
-            </a:r>
-          </a:p>
-          <a:p>
-            <a:pPr marL="342900" indent="-342900">
-              <a:buFont typeface="Arial" panose="020B0604020202020204" pitchFamily="34" charset="0"/>
-              <a:buChar char="•"/>
-            </a:pPr>
-            <a:r>
-              <a:rPr lang="en-US" sz="2400" dirty="0">
-                <a:latin typeface="Cambria" panose="02040503050406030204" pitchFamily="18" charset="0"/>
-              </a:rPr>
-              <a:t>Correlation between ELA Proficiency/Median Income: r=0.51,  p=2x10</a:t>
-            </a:r>
-            <a:r>
-              <a:rPr lang="en-US" sz="2400" baseline="30000" dirty="0">
-                <a:latin typeface="Cambria" panose="02040503050406030204" pitchFamily="18" charset="0"/>
-              </a:rPr>
-              <a:t>-16</a:t>
-            </a:r>
-          </a:p>
-          <a:p>
-            <a:pPr marL="342900" indent="-342900">
-              <a:buFont typeface="Arial" panose="020B0604020202020204" pitchFamily="34" charset="0"/>
-              <a:buChar char="•"/>
-            </a:pPr>
-            <a:endParaRPr lang="en-US" sz="2400" baseline="30000" dirty="0">
-              <a:latin typeface="Cambria" panose="02040503050406030204" pitchFamily="18" charset="0"/>
-            </a:endParaRPr>
-          </a:p>
-          <a:p>
-            <a:pPr marL="342900" indent="-342900">
-              <a:buFont typeface="Arial" panose="020B0604020202020204" pitchFamily="34" charset="0"/>
-              <a:buChar char="•"/>
-            </a:pPr>
-            <a:r>
-              <a:rPr lang="en-US" sz="2400" dirty="0">
-                <a:latin typeface="Cambria" panose="02040503050406030204" pitchFamily="18" charset="0"/>
-              </a:rPr>
-              <a:t>Average Proficient by Year (ELA/Math):  </a:t>
-            </a:r>
-          </a:p>
-          <a:p>
-            <a:r>
-              <a:rPr lang="en-US" sz="2400" dirty="0">
-                <a:latin typeface="Cambria" panose="02040503050406030204" pitchFamily="18" charset="0"/>
-              </a:rPr>
-              <a:t>		2013: 27.6%, 31.0%				2014 : 29.5%, 35.6%		</a:t>
-            </a:r>
-          </a:p>
-          <a:p>
-            <a:r>
-              <a:rPr lang="en-US" sz="2400" dirty="0">
-                <a:latin typeface="Cambria" panose="02040503050406030204" pitchFamily="18" charset="0"/>
-              </a:rPr>
-              <a:t>		2015: 31.5%, 36.4%				2016: 39. 3%, 37.6%</a:t>
-            </a:r>
-          </a:p>
-          <a:p>
-            <a:endParaRPr lang="en-US" sz="2400" dirty="0">
-              <a:latin typeface="Cambria" panose="02040503050406030204" pitchFamily="18" charset="0"/>
-            </a:endParaRPr>
-          </a:p>
-          <a:p>
-            <a:pPr marL="342900" indent="-342900">
-              <a:buFont typeface="Arial" panose="020B0604020202020204" pitchFamily="34" charset="0"/>
-              <a:buChar char="•"/>
-            </a:pPr>
-            <a:r>
-              <a:rPr lang="en-US" sz="2400" dirty="0">
-                <a:latin typeface="Cambria" panose="02040503050406030204" pitchFamily="18" charset="0"/>
-              </a:rPr>
-              <a:t>Average Proficient by Grade (ELA/Math):</a:t>
-            </a:r>
-          </a:p>
-          <a:p>
-            <a:pPr lvl="2"/>
-            <a:r>
-              <a:rPr lang="en-US" sz="2400" dirty="0">
-                <a:latin typeface="Cambria" panose="02040503050406030204" pitchFamily="18" charset="0"/>
-              </a:rPr>
-              <a:t>3        33.1%, 38.6%		4        33.7%, 40.1%</a:t>
-            </a:r>
-          </a:p>
-          <a:p>
-            <a:pPr lvl="2"/>
-            <a:r>
-              <a:rPr lang="en-US" sz="2400" dirty="0">
-                <a:latin typeface="Cambria" panose="02040503050406030204" pitchFamily="18" charset="0"/>
-              </a:rPr>
-              <a:t>5        31.4%, 37.9%		6        29.4%, 34.9%</a:t>
-            </a:r>
-          </a:p>
-          <a:p>
-            <a:pPr lvl="2"/>
-            <a:r>
-              <a:rPr lang="en-US" sz="2400" dirty="0">
-                <a:latin typeface="Cambria" panose="02040503050406030204" pitchFamily="18" charset="0"/>
-              </a:rPr>
-              <a:t>7        30.4%, 31.6%		8        33.6%, 25.6%</a:t>
-            </a:r>
-            <a:endParaRPr lang="en-US" sz="2400" dirty="0">
-              <a:latin typeface="Cambria" panose="02040503050406030204" pitchFamily="18" charset="0"/>
-            </a:endParaRPr>
+              <a:t>School Proficiency is Correlated (Imperfectly) with Neighborhood Income</a:t>
+            </a:r>
           </a:p>
         </p:txBody>
       </p:sp>
@@ -6605,16 +6532,40 @@
           <a:chExt cx="0" cy="0"/>
         </a:xfrm>
       </p:grpSpPr>
-      <p:sp>
-        <p:nvSpPr>
-          <p:cNvPr id="2" name="TextBox 1"/>
+      <p:pic>
+        <p:nvPicPr>
+          <p:cNvPr id="2" name="Picture 1"/>
+          <p:cNvPicPr>
+            <a:picLocks noChangeAspect="1"/>
+          </p:cNvPicPr>
+          <p:nvPr/>
+        </p:nvPicPr>
+        <p:blipFill>
+          <a:blip r:embed="rId2"/>
+          <a:stretch>
+            <a:fillRect/>
+          </a:stretch>
+        </p:blipFill>
+        <p:spPr>
+          <a:xfrm>
+            <a:off x="2614114" y="1856597"/>
+            <a:ext cx="7056134" cy="3828296"/>
+          </a:xfrm>
+          <a:prstGeom prst="rect">
+            <a:avLst/>
+          </a:prstGeom>
+        </p:spPr>
+      </p:pic>
+      <p:sp>
+        <p:nvSpPr>
+          <p:cNvPr id="3" name="TextBox 2"/>
           <p:cNvSpPr txBox="1"/>
           <p:nvPr/>
         </p:nvSpPr>
         <p:spPr>
           <a:xfrm>
-            <a:off x="1664208" y="1381096"/>
-            <a:ext cx="9125712" cy="3908762"/>
+            <a:off x="2710872" y="849746"/>
+            <a:ext cx="6862618" cy="523220"/>
           </a:xfrm>
           <a:prstGeom prst="rect">
             <a:avLst/>
@@ -6632,103 +6583,15 @@
               <a:rPr lang="en-US" sz="2800" b="1" dirty="0">
                 <a:latin typeface="Cambria" panose="02040503050406030204" pitchFamily="18" charset="0"/>
               </a:rPr>
-              <a:t>Key Results (Part 2)</a:t>
-            </a:r>
-          </a:p>
-          <a:p>
-            <a:pPr algn="ctr"/>
-            <a:endParaRPr lang="en-US" sz="2800" b="1" dirty="0">
-              <a:latin typeface="Cambria" panose="02040503050406030204" pitchFamily="18" charset="0"/>
-            </a:endParaRPr>
-          </a:p>
-          <a:p>
-            <a:r>
-              <a:rPr lang="en-US" sz="2400" dirty="0">
-                <a:latin typeface="Cambria" panose="02040503050406030204" pitchFamily="18" charset="0"/>
-              </a:rPr>
-              <a:t>Third Grade 2013 to Sixth Grade 2016(Math)34.0%</a:t>
-            </a:r>
-            <a:r>
-              <a:rPr lang="en-US" sz="2400" dirty="0">
-                <a:latin typeface="Cambria" panose="02040503050406030204" pitchFamily="18" charset="0"/>
-                <a:sym typeface="Wingdings" panose="05000000000000000000" pitchFamily="2" charset="2"/>
-              </a:rPr>
-              <a:t> 38.2% </a:t>
-            </a:r>
-          </a:p>
-          <a:p>
-            <a:r>
-              <a:rPr lang="en-US" sz="2400" dirty="0">
-                <a:latin typeface="Cambria" panose="02040503050406030204" pitchFamily="18" charset="0"/>
-                <a:sym typeface="Wingdings" panose="05000000000000000000" pitchFamily="2" charset="2"/>
-              </a:rPr>
-              <a:t>Fourth Grade 2013 to Seventh Grade 2016(Math): 36.5% 35.4%</a:t>
-            </a:r>
-          </a:p>
-          <a:p>
-            <a:r>
-              <a:rPr lang="en-US" sz="2400" dirty="0">
-                <a:latin typeface="Cambria" panose="02040503050406030204" pitchFamily="18" charset="0"/>
-                <a:sym typeface="Wingdings" panose="05000000000000000000" pitchFamily="2" charset="2"/>
-              </a:rPr>
-              <a:t>Fifth Grade 2013 to Eighth Grade 2016 (Math): 30.7% 26.4%</a:t>
-            </a:r>
-            <a:endParaRPr lang="en-US" sz="2400" dirty="0">
-              <a:latin typeface="Cambria" panose="02040503050406030204" pitchFamily="18" charset="0"/>
-            </a:endParaRPr>
-          </a:p>
-          <a:p>
-            <a:endParaRPr lang="en-US" sz="2400" dirty="0">
-              <a:latin typeface="Cambria" panose="02040503050406030204" pitchFamily="18" charset="0"/>
-            </a:endParaRPr>
-          </a:p>
-          <a:p>
-            <a:r>
-              <a:rPr lang="en-US" sz="2400" dirty="0">
-                <a:latin typeface="Cambria" panose="02040503050406030204" pitchFamily="18" charset="0"/>
-              </a:rPr>
-              <a:t>Third Grade 2013 to Sixth Grade 2016(ELA): 28.9%</a:t>
-            </a:r>
-            <a:r>
-              <a:rPr lang="en-US" sz="2400" dirty="0">
-                <a:latin typeface="Cambria" panose="02040503050406030204" pitchFamily="18" charset="0"/>
-                <a:sym typeface="Wingdings" panose="05000000000000000000" pitchFamily="2" charset="2"/>
-              </a:rPr>
-              <a:t> 36.0%</a:t>
-            </a:r>
-          </a:p>
-          <a:p>
-            <a:r>
-              <a:rPr lang="en-US" sz="2400" dirty="0">
-                <a:latin typeface="Cambria" panose="02040503050406030204" pitchFamily="18" charset="0"/>
-                <a:sym typeface="Wingdings" panose="05000000000000000000" pitchFamily="2" charset="2"/>
-              </a:rPr>
-              <a:t>Fourth Grade 2013 to Seventh Grade 2016(ELA): 28.1% 37.4%</a:t>
-            </a:r>
-          </a:p>
-          <a:p>
-            <a:r>
-              <a:rPr lang="en-US" sz="2400" dirty="0">
-                <a:latin typeface="Cambria" panose="02040503050406030204" pitchFamily="18" charset="0"/>
-                <a:sym typeface="Wingdings" panose="05000000000000000000" pitchFamily="2" charset="2"/>
-              </a:rPr>
-              <a:t>Fifth Grade 2013 to Eighth Grade 2016(ELA): 29.9%42.4%</a:t>
-            </a:r>
-            <a:endParaRPr lang="en-US" sz="2400" dirty="0">
-              <a:latin typeface="Cambria" panose="02040503050406030204" pitchFamily="18" charset="0"/>
-            </a:endParaRPr>
-          </a:p>
-          <a:p>
-            <a:endParaRPr lang="en-US" sz="2400" dirty="0">
-              <a:latin typeface="Cambria" panose="02040503050406030204" pitchFamily="18" charset="0"/>
-            </a:endParaRPr>
+              <a:t>Scores are Increasing Each Year…</a:t>
+            </a:r>
           </a:p>
         </p:txBody>
       </p:sp>
     </p:spTree>
     <p:extLst>
       <p:ext uri="{BB962C8B-B14F-4D97-AF65-F5344CB8AC3E}">
-        <p14:creationId xmlns:p14="http://schemas.microsoft.com/office/powerpoint/2010/main" val="2714388764"/>
+        <p14:creationId xmlns:p14="http://schemas.microsoft.com/office/powerpoint/2010/main" val="2252839309"/>
       </p:ext>
     </p:extLst>
   </p:cSld>
@@ -6755,6 +6618,200 @@
           <a:chExt cx="0" cy="0"/>
         </a:xfrm>
       </p:grpSpPr>
+      <p:pic>
+        <p:nvPicPr>
+          <p:cNvPr id="2" name="Picture 1"/>
+          <p:cNvPicPr>
+            <a:picLocks noChangeAspect="1"/>
+          </p:cNvPicPr>
+          <p:nvPr/>
+        </p:nvPicPr>
+        <p:blipFill>
+          <a:blip r:embed="rId2"/>
+          <a:stretch>
+            <a:fillRect/>
+          </a:stretch>
+        </p:blipFill>
+        <p:spPr>
+          <a:xfrm>
+            <a:off x="2348858" y="1819652"/>
+            <a:ext cx="7056134" cy="3828296"/>
+          </a:xfrm>
+          <a:prstGeom prst="rect">
+            <a:avLst/>
+          </a:prstGeom>
+        </p:spPr>
+      </p:pic>
+      <p:sp>
+        <p:nvSpPr>
+          <p:cNvPr id="3" name="TextBox 2"/>
+          <p:cNvSpPr txBox="1"/>
+          <p:nvPr/>
+        </p:nvSpPr>
+        <p:spPr>
+          <a:xfrm>
+            <a:off x="2348858" y="831850"/>
+            <a:ext cx="7229251" cy="523220"/>
+          </a:xfrm>
+          <a:prstGeom prst="rect">
+            <a:avLst/>
+          </a:prstGeom>
+          <a:noFill/>
+        </p:spPr>
+        <p:txBody>
+          <a:bodyPr wrap="square" rtlCol="0">
+            <a:spAutoFit/>
+          </a:bodyPr>
+          <a:lstStyle/>
+          <a:p>
+            <a:r>
+              <a:rPr lang="en-US" sz="2800" b="1" dirty="0">
+                <a:latin typeface="Cambria" panose="02040503050406030204" pitchFamily="18" charset="0"/>
+              </a:rPr>
+              <a:t>…but Students Perform Worse as They Age </a:t>
+            </a:r>
+          </a:p>
+        </p:txBody>
+      </p:sp>
+    </p:spTree>
+    <p:extLst>
+      <p:ext uri="{BB962C8B-B14F-4D97-AF65-F5344CB8AC3E}">
+        <p14:creationId xmlns:p14="http://schemas.microsoft.com/office/powerpoint/2010/main" val="3039478564"/>
+      </p:ext>
+    </p:extLst>
+  </p:cSld>
+  <p:clrMapOvr>
+    <a:masterClrMapping/>
+  </p:clrMapOvr>
+</p:sld>
+</file>
+
+<file path=ppt/slides/slide7.xml><?xml version="1.0" encoding="utf-8"?>
+<p:sld xmlns:a="http://schemas.openxmlformats.org/drawingml/2006/main" xmlns:r="http://schemas.openxmlformats.org/officeDocument/2006/relationships" xmlns:p="http://schemas.openxmlformats.org/presentationml/2006/main">
+  <p:cSld>
+    <p:spTree>
+      <p:nvGrpSpPr>
+        <p:cNvPr id="1" name=""/>
+        <p:cNvGrpSpPr/>
+        <p:nvPr/>
+      </p:nvGrpSpPr>
+      <p:grpSpPr>
+        <a:xfrm>
+          <a:off x="0" y="0"/>
+          <a:ext cx="0" cy="0"/>
+          <a:chOff x="0" y="0"/>
+          <a:chExt cx="0" cy="0"/>
+        </a:xfrm>
+      </p:grpSpPr>
+      <p:pic>
+        <p:nvPicPr>
+          <p:cNvPr id="3" name="Picture 2"/>
+          <p:cNvPicPr>
+            <a:picLocks noChangeAspect="1"/>
+          </p:cNvPicPr>
+          <p:nvPr/>
+        </p:nvPicPr>
+        <p:blipFill>
+          <a:blip r:embed="rId2"/>
+          <a:stretch>
+            <a:fillRect/>
+          </a:stretch>
+        </p:blipFill>
+        <p:spPr>
+          <a:xfrm>
+            <a:off x="6132945" y="2619234"/>
+            <a:ext cx="6059055" cy="3287332"/>
+          </a:xfrm>
+          <a:prstGeom prst="rect">
+            <a:avLst/>
+          </a:prstGeom>
+        </p:spPr>
+      </p:pic>
+      <p:pic>
+        <p:nvPicPr>
+          <p:cNvPr id="6" name="Picture 5"/>
+          <p:cNvPicPr>
+            <a:picLocks noChangeAspect="1"/>
+          </p:cNvPicPr>
+          <p:nvPr/>
+        </p:nvPicPr>
+        <p:blipFill>
+          <a:blip r:embed="rId3"/>
+          <a:stretch>
+            <a:fillRect/>
+          </a:stretch>
+        </p:blipFill>
+        <p:spPr>
+          <a:xfrm>
+            <a:off x="0" y="2614223"/>
+            <a:ext cx="6068291" cy="3292343"/>
+          </a:xfrm>
+          <a:prstGeom prst="rect">
+            <a:avLst/>
+          </a:prstGeom>
+        </p:spPr>
+      </p:pic>
+      <p:sp>
+        <p:nvSpPr>
+          <p:cNvPr id="7" name="TextBox 6"/>
+          <p:cNvSpPr txBox="1"/>
+          <p:nvPr/>
+        </p:nvSpPr>
+        <p:spPr>
+          <a:xfrm>
+            <a:off x="2318327" y="1293090"/>
+            <a:ext cx="7499927" cy="523220"/>
+          </a:xfrm>
+          <a:prstGeom prst="rect">
+            <a:avLst/>
+          </a:prstGeom>
+          <a:noFill/>
+        </p:spPr>
+        <p:txBody>
+          <a:bodyPr wrap="square" rtlCol="0">
+            <a:spAutoFit/>
+          </a:bodyPr>
+          <a:lstStyle/>
+          <a:p>
+            <a:r>
+              <a:rPr lang="en-US" sz="2800" b="1" dirty="0">
+                <a:latin typeface="Cambria" panose="02040503050406030204" pitchFamily="18" charset="0"/>
+              </a:rPr>
+              <a:t>Cohorts Improve in English, but not in Math</a:t>
+            </a:r>
+          </a:p>
+        </p:txBody>
+      </p:sp>
+    </p:spTree>
+    <p:extLst>
+      <p:ext uri="{BB962C8B-B14F-4D97-AF65-F5344CB8AC3E}">
+        <p14:creationId xmlns:p14="http://schemas.microsoft.com/office/powerpoint/2010/main" val="2714388764"/>
+      </p:ext>
+    </p:extLst>
+  </p:cSld>
+  <p:clrMapOvr>
+    <a:masterClrMapping/>
+  </p:clrMapOvr>
+</p:sld>
+</file>
+
+<file path=ppt/slides/slide8.xml><?xml version="1.0" encoding="utf-8"?>
+<p:sld xmlns:a="http://schemas.openxmlformats.org/drawingml/2006/main" xmlns:r="http://schemas.openxmlformats.org/officeDocument/2006/relationships" xmlns:p="http://schemas.openxmlformats.org/presentationml/2006/main">
+  <p:cSld>
+    <p:spTree>
+      <p:nvGrpSpPr>
+        <p:cNvPr id="1" name=""/>
+        <p:cNvGrpSpPr/>
+        <p:nvPr/>
+      </p:nvGrpSpPr>
+      <p:grpSpPr>
+        <a:xfrm>
+          <a:off x="0" y="0"/>
+          <a:ext cx="0" cy="0"/>
+          <a:chOff x="0" y="0"/>
+          <a:chExt cx="0" cy="0"/>
+        </a:xfrm>
+      </p:grpSpPr>
       <p:sp>
         <p:nvSpPr>
           <p:cNvPr id="2" name="TextBox 1"/>
@@ -6841,9 +6898,6 @@
               </a:rPr>
               <a:t> Income demographics mean something, but not everything!</a:t>
             </a:r>
-            <a:endParaRPr lang="en-US" sz="2400" dirty="0">
-              <a:latin typeface="Cambria" panose="02040503050406030204" pitchFamily="18" charset="0"/>
-            </a:endParaRPr>
           </a:p>
         </p:txBody>
       </p:sp>

</xml_diff>